<commit_message>
Prettify python and Docker files, and finalize powerpoint
</commit_message>
<xml_diff>
--- a/Lecture2/Lecture2Ex.pptx
+++ b/Lecture2/Lecture2Ex.pptx
@@ -6,14 +6,13 @@
   </p:sldMasterIdLst>
   <p:sldIdLst>
     <p:sldId id="256" r:id="rId2"/>
-    <p:sldId id="264" r:id="rId3"/>
-    <p:sldId id="257" r:id="rId4"/>
-    <p:sldId id="258" r:id="rId5"/>
-    <p:sldId id="259" r:id="rId6"/>
-    <p:sldId id="260" r:id="rId7"/>
-    <p:sldId id="261" r:id="rId8"/>
-    <p:sldId id="262" r:id="rId9"/>
-    <p:sldId id="263" r:id="rId10"/>
+    <p:sldId id="257" r:id="rId3"/>
+    <p:sldId id="258" r:id="rId4"/>
+    <p:sldId id="259" r:id="rId5"/>
+    <p:sldId id="260" r:id="rId6"/>
+    <p:sldId id="261" r:id="rId7"/>
+    <p:sldId id="262" r:id="rId8"/>
+    <p:sldId id="263" r:id="rId9"/>
   </p:sldIdLst>
   <p:sldSz cx="12192000" cy="6858000"/>
   <p:notesSz cx="6858000" cy="9144000"/>
@@ -112,6 +111,11 @@
       </a:defRPr>
     </a:lvl9pPr>
   </p:defaultTextStyle>
+  <p:extLst>
+    <p:ext uri="{EFAFB233-063F-42B5-8137-9DF3F51BA10A}">
+      <p15:sldGuideLst xmlns:p15="http://schemas.microsoft.com/office/powerpoint/2012/main"/>
+    </p:ext>
+  </p:extLst>
 </p:presentation>
 </file>
 
@@ -264,7 +268,7 @@
           <a:p>
             <a:fld id="{C5D9D9F4-EA34-4DDF-B426-ED2F0139D4E2}" type="datetimeFigureOut">
               <a:rPr lang="en-DK" smtClean="0"/>
-              <a:t>12/09/2021</a:t>
+              <a:t>13/09/2021</a:t>
             </a:fld>
             <a:endParaRPr lang="en-DK"/>
           </a:p>
@@ -464,7 +468,7 @@
           <a:p>
             <a:fld id="{C5D9D9F4-EA34-4DDF-B426-ED2F0139D4E2}" type="datetimeFigureOut">
               <a:rPr lang="en-DK" smtClean="0"/>
-              <a:t>12/09/2021</a:t>
+              <a:t>13/09/2021</a:t>
             </a:fld>
             <a:endParaRPr lang="en-DK"/>
           </a:p>
@@ -674,7 +678,7 @@
           <a:p>
             <a:fld id="{C5D9D9F4-EA34-4DDF-B426-ED2F0139D4E2}" type="datetimeFigureOut">
               <a:rPr lang="en-DK" smtClean="0"/>
-              <a:t>12/09/2021</a:t>
+              <a:t>13/09/2021</a:t>
             </a:fld>
             <a:endParaRPr lang="en-DK"/>
           </a:p>
@@ -874,7 +878,7 @@
           <a:p>
             <a:fld id="{C5D9D9F4-EA34-4DDF-B426-ED2F0139D4E2}" type="datetimeFigureOut">
               <a:rPr lang="en-DK" smtClean="0"/>
-              <a:t>12/09/2021</a:t>
+              <a:t>13/09/2021</a:t>
             </a:fld>
             <a:endParaRPr lang="en-DK"/>
           </a:p>
@@ -1150,7 +1154,7 @@
           <a:p>
             <a:fld id="{C5D9D9F4-EA34-4DDF-B426-ED2F0139D4E2}" type="datetimeFigureOut">
               <a:rPr lang="en-DK" smtClean="0"/>
-              <a:t>12/09/2021</a:t>
+              <a:t>13/09/2021</a:t>
             </a:fld>
             <a:endParaRPr lang="en-DK"/>
           </a:p>
@@ -1418,7 +1422,7 @@
           <a:p>
             <a:fld id="{C5D9D9F4-EA34-4DDF-B426-ED2F0139D4E2}" type="datetimeFigureOut">
               <a:rPr lang="en-DK" smtClean="0"/>
-              <a:t>12/09/2021</a:t>
+              <a:t>13/09/2021</a:t>
             </a:fld>
             <a:endParaRPr lang="en-DK"/>
           </a:p>
@@ -1833,7 +1837,7 @@
           <a:p>
             <a:fld id="{C5D9D9F4-EA34-4DDF-B426-ED2F0139D4E2}" type="datetimeFigureOut">
               <a:rPr lang="en-DK" smtClean="0"/>
-              <a:t>12/09/2021</a:t>
+              <a:t>13/09/2021</a:t>
             </a:fld>
             <a:endParaRPr lang="en-DK"/>
           </a:p>
@@ -1975,7 +1979,7 @@
           <a:p>
             <a:fld id="{C5D9D9F4-EA34-4DDF-B426-ED2F0139D4E2}" type="datetimeFigureOut">
               <a:rPr lang="en-DK" smtClean="0"/>
-              <a:t>12/09/2021</a:t>
+              <a:t>13/09/2021</a:t>
             </a:fld>
             <a:endParaRPr lang="en-DK"/>
           </a:p>
@@ -2088,7 +2092,7 @@
           <a:p>
             <a:fld id="{C5D9D9F4-EA34-4DDF-B426-ED2F0139D4E2}" type="datetimeFigureOut">
               <a:rPr lang="en-DK" smtClean="0"/>
-              <a:t>12/09/2021</a:t>
+              <a:t>13/09/2021</a:t>
             </a:fld>
             <a:endParaRPr lang="en-DK"/>
           </a:p>
@@ -2401,7 +2405,7 @@
           <a:p>
             <a:fld id="{C5D9D9F4-EA34-4DDF-B426-ED2F0139D4E2}" type="datetimeFigureOut">
               <a:rPr lang="en-DK" smtClean="0"/>
-              <a:t>12/09/2021</a:t>
+              <a:t>13/09/2021</a:t>
             </a:fld>
             <a:endParaRPr lang="en-DK"/>
           </a:p>
@@ -2690,7 +2694,7 @@
           <a:p>
             <a:fld id="{C5D9D9F4-EA34-4DDF-B426-ED2F0139D4E2}" type="datetimeFigureOut">
               <a:rPr lang="en-DK" smtClean="0"/>
-              <a:t>12/09/2021</a:t>
+              <a:t>13/09/2021</a:t>
             </a:fld>
             <a:endParaRPr lang="en-DK"/>
           </a:p>
@@ -2933,7 +2937,7 @@
           <a:p>
             <a:fld id="{C5D9D9F4-EA34-4DDF-B426-ED2F0139D4E2}" type="datetimeFigureOut">
               <a:rPr lang="en-DK" smtClean="0"/>
-              <a:t>12/09/2021</a:t>
+              <a:t>13/09/2021</a:t>
             </a:fld>
             <a:endParaRPr lang="en-DK"/>
           </a:p>
@@ -3402,13 +3406,9 @@
           <a:p>
             <a:r>
               <a:rPr lang="en-US" dirty="0"/>
-              <a:t>Daniel Skjold </a:t>
-            </a:r>
-            <a:r>
-              <a:rPr lang="en-US"/>
-              <a:t>Toft – datof16@student.sdu.dk</a:t>
-            </a:r>
-            <a:endParaRPr lang="en-DK"/>
+              <a:t>Daniel Skjold Toft – datof16@student.sdu.dk</a:t>
+            </a:r>
+            <a:endParaRPr lang="en-DK" dirty="0"/>
           </a:p>
         </p:txBody>
       </p:sp>
@@ -3447,7 +3447,7 @@
           <p:cNvPr id="2" name="Titel 1">
             <a:extLst>
               <a:ext uri="{FF2B5EF4-FFF2-40B4-BE49-F238E27FC236}">
-                <a16:creationId xmlns:a16="http://schemas.microsoft.com/office/drawing/2014/main" id="{14FF7153-FFB5-433F-BC42-D300C6025D52}"/>
+                <a16:creationId xmlns:a16="http://schemas.microsoft.com/office/drawing/2014/main" id="{7E31BAF0-7B58-46CB-AFC0-B1F6361AF2B8}"/>
               </a:ext>
             </a:extLst>
           </p:cNvPr>
@@ -3465,7 +3465,7 @@
           <a:p>
             <a:r>
               <a:rPr lang="en-US" dirty="0"/>
-              <a:t>TO-DO</a:t>
+              <a:t>Docker-compose a HDFS cluster</a:t>
             </a:r>
             <a:endParaRPr lang="en-DK" dirty="0"/>
           </a:p>
@@ -3476,7 +3476,7 @@
           <p:cNvPr id="3" name="Pladsholder til indhold 2">
             <a:extLst>
               <a:ext uri="{FF2B5EF4-FFF2-40B4-BE49-F238E27FC236}">
-                <a16:creationId xmlns:a16="http://schemas.microsoft.com/office/drawing/2014/main" id="{CA1BAE37-2931-45B1-8840-2922995FD586}"/>
+                <a16:creationId xmlns:a16="http://schemas.microsoft.com/office/drawing/2014/main" id="{00D9F290-9323-4AC7-8C0D-8CB0E23C25EB}"/>
               </a:ext>
             </a:extLst>
           </p:cNvPr>
@@ -3494,19 +3494,40 @@
           <a:p>
             <a:r>
               <a:rPr lang="en-US" dirty="0"/>
-              <a:t>Prettify python files (docker tags, comments, etc.)</a:t>
-            </a:r>
-          </a:p>
-          <a:p>
-            <a:r>
-              <a:rPr lang="en-US" dirty="0"/>
-              <a:t>Presentation</a:t>
-            </a:r>
-          </a:p>
-          <a:p>
-            <a:r>
-              <a:rPr lang="en-US" dirty="0"/>
-              <a:t>Example with Parquet</a:t>
+              <a:t>A </a:t>
+            </a:r>
+            <a:r>
+              <a:rPr lang="en-US" dirty="0" err="1"/>
+              <a:t>namenode</a:t>
+            </a:r>
+            <a:r>
+              <a:rPr lang="en-US" dirty="0"/>
+              <a:t> and 3 </a:t>
+            </a:r>
+            <a:r>
+              <a:rPr lang="en-US" dirty="0" err="1"/>
+              <a:t>datanodes</a:t>
+            </a:r>
+            <a:endParaRPr lang="en-US" dirty="0"/>
+          </a:p>
+          <a:p>
+            <a:r>
+              <a:rPr lang="en-US" dirty="0"/>
+              <a:t>One network – “</a:t>
+            </a:r>
+            <a:r>
+              <a:rPr lang="en-US" dirty="0" err="1"/>
+              <a:t>hadoop</a:t>
+            </a:r>
+            <a:r>
+              <a:rPr lang="en-US" dirty="0"/>
+              <a:t>”</a:t>
+            </a:r>
+          </a:p>
+          <a:p>
+            <a:r>
+              <a:rPr lang="en-US" dirty="0"/>
+              <a:t>4 volumes – docker’s way of saving data</a:t>
             </a:r>
             <a:endParaRPr lang="en-DK" dirty="0"/>
           </a:p>
@@ -3515,7 +3536,7 @@
     </p:spTree>
     <p:extLst>
       <p:ext uri="{BB962C8B-B14F-4D97-AF65-F5344CB8AC3E}">
-        <p14:creationId xmlns:p14="http://schemas.microsoft.com/office/powerpoint/2010/main" val="517647081"/>
+        <p14:creationId xmlns:p14="http://schemas.microsoft.com/office/powerpoint/2010/main" val="1863327998"/>
       </p:ext>
     </p:extLst>
   </p:cSld>
@@ -3547,7 +3568,7 @@
           <p:cNvPr id="2" name="Titel 1">
             <a:extLst>
               <a:ext uri="{FF2B5EF4-FFF2-40B4-BE49-F238E27FC236}">
-                <a16:creationId xmlns:a16="http://schemas.microsoft.com/office/drawing/2014/main" id="{7E31BAF0-7B58-46CB-AFC0-B1F6361AF2B8}"/>
+                <a16:creationId xmlns:a16="http://schemas.microsoft.com/office/drawing/2014/main" id="{9BB1FE58-3763-476F-A467-6EB1FD2342B6}"/>
               </a:ext>
             </a:extLst>
           </p:cNvPr>
@@ -3565,7 +3586,23 @@
           <a:p>
             <a:r>
               <a:rPr lang="en-US" dirty="0"/>
-              <a:t>Docker-compose a HDFS cluster</a:t>
+              <a:t>Docker exec –</a:t>
+            </a:r>
+            <a:r>
+              <a:rPr lang="en-US" dirty="0" err="1"/>
+              <a:t>ti</a:t>
+            </a:r>
+            <a:r>
+              <a:rPr lang="en-US" dirty="0"/>
+              <a:t> </a:t>
+            </a:r>
+            <a:r>
+              <a:rPr lang="en-US" dirty="0" err="1"/>
+              <a:t>namenode</a:t>
+            </a:r>
+            <a:r>
+              <a:rPr lang="en-US" dirty="0"/>
+              <a:t> /bin/bash</a:t>
             </a:r>
             <a:endParaRPr lang="en-DK" dirty="0"/>
           </a:p>
@@ -3576,7 +3613,7 @@
           <p:cNvPr id="3" name="Pladsholder til indhold 2">
             <a:extLst>
               <a:ext uri="{FF2B5EF4-FFF2-40B4-BE49-F238E27FC236}">
-                <a16:creationId xmlns:a16="http://schemas.microsoft.com/office/drawing/2014/main" id="{00D9F290-9323-4AC7-8C0D-8CB0E23C25EB}"/>
+                <a16:creationId xmlns:a16="http://schemas.microsoft.com/office/drawing/2014/main" id="{9462B2FC-C837-4A54-BCB8-B73FF6E849CD}"/>
               </a:ext>
             </a:extLst>
           </p:cNvPr>
@@ -3592,14 +3629,52 @@
           <a:bodyPr/>
           <a:lstStyle/>
           <a:p>
-            <a:endParaRPr lang="en-DK"/>
+            <a:r>
+              <a:rPr lang="en-US" dirty="0"/>
+              <a:t>Docker exec allows us to execute commands in the docker container</a:t>
+            </a:r>
+          </a:p>
+          <a:p>
+            <a:r>
+              <a:rPr lang="en-US" dirty="0"/>
+              <a:t>-</a:t>
+            </a:r>
+            <a:r>
+              <a:rPr lang="en-US" dirty="0" err="1"/>
+              <a:t>ti</a:t>
+            </a:r>
+            <a:r>
+              <a:rPr lang="en-US" dirty="0"/>
+              <a:t> creates an interactive shell</a:t>
+            </a:r>
+          </a:p>
+          <a:p>
+            <a:r>
+              <a:rPr lang="en-US" dirty="0"/>
+              <a:t>“</a:t>
+            </a:r>
+            <a:r>
+              <a:rPr lang="en-US" dirty="0" err="1"/>
+              <a:t>namenode</a:t>
+            </a:r>
+            <a:r>
+              <a:rPr lang="en-US" dirty="0"/>
+              <a:t>” is the docker container name</a:t>
+            </a:r>
+          </a:p>
+          <a:p>
+            <a:r>
+              <a:rPr lang="en-US" dirty="0"/>
+              <a:t>/bin/bash is the shell we want</a:t>
+            </a:r>
+            <a:endParaRPr lang="en-DK" dirty="0"/>
           </a:p>
         </p:txBody>
       </p:sp>
     </p:spTree>
     <p:extLst>
       <p:ext uri="{BB962C8B-B14F-4D97-AF65-F5344CB8AC3E}">
-        <p14:creationId xmlns:p14="http://schemas.microsoft.com/office/powerpoint/2010/main" val="1863327998"/>
+        <p14:creationId xmlns:p14="http://schemas.microsoft.com/office/powerpoint/2010/main" val="2280990272"/>
       </p:ext>
     </p:extLst>
   </p:cSld>
@@ -3631,7 +3706,7 @@
           <p:cNvPr id="2" name="Titel 1">
             <a:extLst>
               <a:ext uri="{FF2B5EF4-FFF2-40B4-BE49-F238E27FC236}">
-                <a16:creationId xmlns:a16="http://schemas.microsoft.com/office/drawing/2014/main" id="{9BB1FE58-3763-476F-A467-6EB1FD2342B6}"/>
+                <a16:creationId xmlns:a16="http://schemas.microsoft.com/office/drawing/2014/main" id="{9134D657-49EC-4452-A56D-F46D356FEDD3}"/>
               </a:ext>
             </a:extLst>
           </p:cNvPr>
@@ -3649,57 +3724,93 @@
           <a:p>
             <a:r>
               <a:rPr lang="en-US" dirty="0"/>
-              <a:t>Docker exec –</a:t>
-            </a:r>
+              <a:t>Basic HDFS shell commands</a:t>
+            </a:r>
+            <a:endParaRPr lang="en-DK" dirty="0"/>
+          </a:p>
+        </p:txBody>
+      </p:sp>
+      <p:sp>
+        <p:nvSpPr>
+          <p:cNvPr id="3" name="Pladsholder til indhold 2">
+            <a:extLst>
+              <a:ext uri="{FF2B5EF4-FFF2-40B4-BE49-F238E27FC236}">
+                <a16:creationId xmlns:a16="http://schemas.microsoft.com/office/drawing/2014/main" id="{735B64A2-6412-4EC6-9133-9AFDA6C24468}"/>
+              </a:ext>
+            </a:extLst>
+          </p:cNvPr>
+          <p:cNvSpPr>
+            <a:spLocks noGrp="1"/>
+          </p:cNvSpPr>
+          <p:nvPr>
+            <p:ph idx="1"/>
+          </p:nvPr>
+        </p:nvSpPr>
+        <p:spPr/>
+        <p:txBody>
+          <a:bodyPr/>
+          <a:lstStyle/>
+          <a:p>
             <a:r>
               <a:rPr lang="en-US" dirty="0" err="1"/>
-              <a:t>ti</a:t>
-            </a:r>
-            <a:r>
-              <a:rPr lang="en-US" dirty="0"/>
-              <a:t> </a:t>
+              <a:t>hadoop</a:t>
+            </a:r>
+            <a:r>
+              <a:rPr lang="en-US" dirty="0"/>
+              <a:t> fs –[command] [path]</a:t>
+            </a:r>
+          </a:p>
+          <a:p>
+            <a:r>
+              <a:rPr lang="en-US" dirty="0"/>
+              <a:t>Path is the path in the HDFS folder structure, not the running Linux</a:t>
+            </a:r>
+          </a:p>
+          <a:p>
+            <a:r>
+              <a:rPr lang="en-US" dirty="0"/>
+              <a:t>No –cd command, meaning path always have to be specified</a:t>
+            </a:r>
+          </a:p>
+          <a:p>
+            <a:r>
+              <a:rPr lang="en-US" dirty="0"/>
+              <a:t>-ls</a:t>
+            </a:r>
+          </a:p>
+          <a:p>
+            <a:r>
+              <a:rPr lang="en-US" dirty="0"/>
+              <a:t>-cat</a:t>
+            </a:r>
+          </a:p>
+          <a:p>
+            <a:r>
+              <a:rPr lang="en-US" dirty="0"/>
+              <a:t>-put</a:t>
+            </a:r>
+          </a:p>
+          <a:p>
+            <a:r>
+              <a:rPr lang="en-US" dirty="0"/>
+              <a:t>-rm, -touch, -</a:t>
             </a:r>
             <a:r>
               <a:rPr lang="en-US" dirty="0" err="1"/>
-              <a:t>namenode</a:t>
-            </a:r>
-            <a:r>
-              <a:rPr lang="en-US" dirty="0"/>
-              <a:t> /bin/bash</a:t>
+              <a:t>mkdir</a:t>
+            </a:r>
+            <a:r>
+              <a:rPr lang="en-US" dirty="0"/>
+              <a:t>, etc.</a:t>
             </a:r>
             <a:endParaRPr lang="en-DK" dirty="0"/>
-          </a:p>
-        </p:txBody>
-      </p:sp>
-      <p:sp>
-        <p:nvSpPr>
-          <p:cNvPr id="3" name="Pladsholder til indhold 2">
-            <a:extLst>
-              <a:ext uri="{FF2B5EF4-FFF2-40B4-BE49-F238E27FC236}">
-                <a16:creationId xmlns:a16="http://schemas.microsoft.com/office/drawing/2014/main" id="{9462B2FC-C837-4A54-BCB8-B73FF6E849CD}"/>
-              </a:ext>
-            </a:extLst>
-          </p:cNvPr>
-          <p:cNvSpPr>
-            <a:spLocks noGrp="1"/>
-          </p:cNvSpPr>
-          <p:nvPr>
-            <p:ph idx="1"/>
-          </p:nvPr>
-        </p:nvSpPr>
-        <p:spPr/>
-        <p:txBody>
-          <a:bodyPr/>
-          <a:lstStyle/>
-          <a:p>
-            <a:endParaRPr lang="en-DK"/>
           </a:p>
         </p:txBody>
       </p:sp>
     </p:spTree>
     <p:extLst>
       <p:ext uri="{BB962C8B-B14F-4D97-AF65-F5344CB8AC3E}">
-        <p14:creationId xmlns:p14="http://schemas.microsoft.com/office/powerpoint/2010/main" val="2280990272"/>
+        <p14:creationId xmlns:p14="http://schemas.microsoft.com/office/powerpoint/2010/main" val="3355785268"/>
       </p:ext>
     </p:extLst>
   </p:cSld>
@@ -3731,7 +3842,7 @@
           <p:cNvPr id="2" name="Titel 1">
             <a:extLst>
               <a:ext uri="{FF2B5EF4-FFF2-40B4-BE49-F238E27FC236}">
-                <a16:creationId xmlns:a16="http://schemas.microsoft.com/office/drawing/2014/main" id="{9134D657-49EC-4452-A56D-F46D356FEDD3}"/>
+                <a16:creationId xmlns:a16="http://schemas.microsoft.com/office/drawing/2014/main" id="{4B578FC5-C516-4E67-A13E-170509E83782}"/>
               </a:ext>
             </a:extLst>
           </p:cNvPr>
@@ -3749,7 +3860,7 @@
           <a:p>
             <a:r>
               <a:rPr lang="en-US" dirty="0"/>
-              <a:t>Basic HDFS shell commands</a:t>
+              <a:t>Python read-write example</a:t>
             </a:r>
             <a:endParaRPr lang="en-DK" dirty="0"/>
           </a:p>
@@ -3760,7 +3871,7 @@
           <p:cNvPr id="3" name="Pladsholder til indhold 2">
             <a:extLst>
               <a:ext uri="{FF2B5EF4-FFF2-40B4-BE49-F238E27FC236}">
-                <a16:creationId xmlns:a16="http://schemas.microsoft.com/office/drawing/2014/main" id="{735B64A2-6412-4EC6-9133-9AFDA6C24468}"/>
+                <a16:creationId xmlns:a16="http://schemas.microsoft.com/office/drawing/2014/main" id="{8066369E-5682-453F-A0F2-F764EBC69724}"/>
               </a:ext>
             </a:extLst>
           </p:cNvPr>
@@ -3776,14 +3887,48 @@
           <a:bodyPr/>
           <a:lstStyle/>
           <a:p>
-            <a:endParaRPr lang="en-DK"/>
+            <a:r>
+              <a:rPr lang="en-US" dirty="0" err="1"/>
+              <a:t>Dockerfile</a:t>
+            </a:r>
+            <a:r>
+              <a:rPr lang="en-US" dirty="0"/>
+              <a:t> – Building Python containers</a:t>
+            </a:r>
+          </a:p>
+          <a:p>
+            <a:r>
+              <a:rPr lang="en-US" dirty="0"/>
+              <a:t>Run.cmd – Build and run container</a:t>
+            </a:r>
+          </a:p>
+          <a:p>
+            <a:r>
+              <a:rPr lang="en-US" dirty="0" err="1"/>
+              <a:t>HdfsCli</a:t>
+            </a:r>
+            <a:endParaRPr lang="en-US" dirty="0"/>
+          </a:p>
+          <a:p>
+            <a:pPr lvl="1"/>
+            <a:r>
+              <a:rPr lang="en-GB" dirty="0">
+                <a:hlinkClick r:id="rId2"/>
+              </a:rPr>
+              <a:t>https://hdfscli.readthedocs.io/en/latest/</a:t>
+            </a:r>
+            <a:r>
+              <a:rPr lang="en-US" dirty="0"/>
+              <a:t> </a:t>
+            </a:r>
+            <a:endParaRPr lang="en-DK" dirty="0"/>
           </a:p>
         </p:txBody>
       </p:sp>
     </p:spTree>
     <p:extLst>
       <p:ext uri="{BB962C8B-B14F-4D97-AF65-F5344CB8AC3E}">
-        <p14:creationId xmlns:p14="http://schemas.microsoft.com/office/powerpoint/2010/main" val="3355785268"/>
+        <p14:creationId xmlns:p14="http://schemas.microsoft.com/office/powerpoint/2010/main" val="3648333444"/>
       </p:ext>
     </p:extLst>
   </p:cSld>
@@ -3815,7 +3960,7 @@
           <p:cNvPr id="2" name="Titel 1">
             <a:extLst>
               <a:ext uri="{FF2B5EF4-FFF2-40B4-BE49-F238E27FC236}">
-                <a16:creationId xmlns:a16="http://schemas.microsoft.com/office/drawing/2014/main" id="{4B578FC5-C516-4E67-A13E-170509E83782}"/>
+                <a16:creationId xmlns:a16="http://schemas.microsoft.com/office/drawing/2014/main" id="{4A2B4F8C-3E55-4F6C-B776-9620524D72F8}"/>
               </a:ext>
             </a:extLst>
           </p:cNvPr>
@@ -3833,7 +3978,7 @@
           <a:p>
             <a:r>
               <a:rPr lang="en-US" dirty="0"/>
-              <a:t>Python read-write example</a:t>
+              <a:t>Python read-write with JSON</a:t>
             </a:r>
             <a:endParaRPr lang="en-DK" dirty="0"/>
           </a:p>
@@ -3844,7 +3989,7 @@
           <p:cNvPr id="3" name="Pladsholder til indhold 2">
             <a:extLst>
               <a:ext uri="{FF2B5EF4-FFF2-40B4-BE49-F238E27FC236}">
-                <a16:creationId xmlns:a16="http://schemas.microsoft.com/office/drawing/2014/main" id="{8066369E-5682-453F-A0F2-F764EBC69724}"/>
+                <a16:creationId xmlns:a16="http://schemas.microsoft.com/office/drawing/2014/main" id="{3017DE31-31A6-4DDD-8B52-17C32643107F}"/>
               </a:ext>
             </a:extLst>
           </p:cNvPr>
@@ -3862,13 +4007,25 @@
           <a:p>
             <a:r>
               <a:rPr lang="en-US" dirty="0"/>
-              <a:t>Running python containers</a:t>
-            </a:r>
-          </a:p>
-          <a:p>
-            <a:r>
-              <a:rPr lang="en-US" dirty="0" err="1"/>
-              <a:t>HdfsCli</a:t>
+              <a:t>Only example.py changes!</a:t>
+            </a:r>
+          </a:p>
+          <a:p>
+            <a:r>
+              <a:rPr lang="en-US" dirty="0"/>
+              <a:t>Extends what we just learned with read-write</a:t>
+            </a:r>
+          </a:p>
+          <a:p>
+            <a:r>
+              <a:rPr lang="en-US" dirty="0"/>
+              <a:t>Uses “Counter” to count words</a:t>
+            </a:r>
+          </a:p>
+          <a:p>
+            <a:r>
+              <a:rPr lang="en-US" dirty="0"/>
+              <a:t>Dumps a JSON structure</a:t>
             </a:r>
             <a:endParaRPr lang="en-DK" dirty="0"/>
           </a:p>
@@ -3877,7 +4034,7 @@
     </p:spTree>
     <p:extLst>
       <p:ext uri="{BB962C8B-B14F-4D97-AF65-F5344CB8AC3E}">
-        <p14:creationId xmlns:p14="http://schemas.microsoft.com/office/powerpoint/2010/main" val="3648333444"/>
+        <p14:creationId xmlns:p14="http://schemas.microsoft.com/office/powerpoint/2010/main" val="3236422911"/>
       </p:ext>
     </p:extLst>
   </p:cSld>
@@ -3909,7 +4066,7 @@
           <p:cNvPr id="2" name="Titel 1">
             <a:extLst>
               <a:ext uri="{FF2B5EF4-FFF2-40B4-BE49-F238E27FC236}">
-                <a16:creationId xmlns:a16="http://schemas.microsoft.com/office/drawing/2014/main" id="{4A2B4F8C-3E55-4F6C-B776-9620524D72F8}"/>
+                <a16:creationId xmlns:a16="http://schemas.microsoft.com/office/drawing/2014/main" id="{C12DA0BA-3AF3-4458-919D-9790B2DF1B79}"/>
               </a:ext>
             </a:extLst>
           </p:cNvPr>
@@ -3927,7 +4084,7 @@
           <a:p>
             <a:r>
               <a:rPr lang="en-US" dirty="0"/>
-              <a:t>Python read-write with JSON</a:t>
+              <a:t>Python read-write with Avro</a:t>
             </a:r>
             <a:endParaRPr lang="en-DK" dirty="0"/>
           </a:p>
@@ -3938,7 +4095,7 @@
           <p:cNvPr id="3" name="Pladsholder til indhold 2">
             <a:extLst>
               <a:ext uri="{FF2B5EF4-FFF2-40B4-BE49-F238E27FC236}">
-                <a16:creationId xmlns:a16="http://schemas.microsoft.com/office/drawing/2014/main" id="{3017DE31-31A6-4DDD-8B52-17C32643107F}"/>
+                <a16:creationId xmlns:a16="http://schemas.microsoft.com/office/drawing/2014/main" id="{CD419720-66BB-4586-B829-8972D766BF42}"/>
               </a:ext>
             </a:extLst>
           </p:cNvPr>
@@ -3954,14 +4111,71 @@
           <a:bodyPr/>
           <a:lstStyle/>
           <a:p>
-            <a:endParaRPr lang="en-DK"/>
+            <a:r>
+              <a:rPr lang="en-US" dirty="0" err="1"/>
+              <a:t>AvroWriter</a:t>
+            </a:r>
+            <a:r>
+              <a:rPr lang="en-US" dirty="0"/>
+              <a:t> from </a:t>
+            </a:r>
+            <a:r>
+              <a:rPr lang="en-US" dirty="0" err="1"/>
+              <a:t>HdfsCli</a:t>
+            </a:r>
+            <a:r>
+              <a:rPr lang="en-US" dirty="0"/>
+              <a:t> Extensions</a:t>
+            </a:r>
+          </a:p>
+          <a:p>
+            <a:pPr lvl="1"/>
+            <a:r>
+              <a:rPr lang="en-US" dirty="0"/>
+              <a:t>Example on </a:t>
+            </a:r>
+            <a:r>
+              <a:rPr lang="en-US" dirty="0" err="1"/>
+              <a:t>HdfsCli</a:t>
+            </a:r>
+            <a:r>
+              <a:rPr lang="en-US" dirty="0"/>
+              <a:t> </a:t>
+            </a:r>
+            <a:r>
+              <a:rPr lang="en-US" dirty="0" err="1"/>
+              <a:t>github</a:t>
+            </a:r>
+            <a:r>
+              <a:rPr lang="en-US" dirty="0"/>
+              <a:t> page</a:t>
+            </a:r>
+          </a:p>
+          <a:p>
+            <a:r>
+              <a:rPr lang="en-US" dirty="0"/>
+              <a:t>Optionally specify a mandatory schema!</a:t>
+            </a:r>
+          </a:p>
+          <a:p>
+            <a:r>
+              <a:rPr lang="en-US" dirty="0"/>
+              <a:t>“content” is summary of the remote file</a:t>
+            </a:r>
+          </a:p>
+          <a:p>
+            <a:r>
+              <a:rPr lang="en-US" dirty="0"/>
+              <a:t>“reader” can be traversed as a list</a:t>
+            </a:r>
+            <a:endParaRPr lang="en-DK" dirty="0"/>
           </a:p>
         </p:txBody>
       </p:sp>
     </p:spTree>
     <p:extLst>
       <p:ext uri="{BB962C8B-B14F-4D97-AF65-F5344CB8AC3E}">
-        <p14:creationId xmlns:p14="http://schemas.microsoft.com/office/powerpoint/2010/main" val="3236422911"/>
+        <p14:creationId xmlns:p14="http://schemas.microsoft.com/office/powerpoint/2010/main" val="4113249153"/>
       </p:ext>
     </p:extLst>
   </p:cSld>
@@ -3993,7 +4207,7 @@
           <p:cNvPr id="2" name="Titel 1">
             <a:extLst>
               <a:ext uri="{FF2B5EF4-FFF2-40B4-BE49-F238E27FC236}">
-                <a16:creationId xmlns:a16="http://schemas.microsoft.com/office/drawing/2014/main" id="{C12DA0BA-3AF3-4458-919D-9790B2DF1B79}"/>
+                <a16:creationId xmlns:a16="http://schemas.microsoft.com/office/drawing/2014/main" id="{B78D32F1-D6C8-4A0E-8C53-522AE907F077}"/>
               </a:ext>
             </a:extLst>
           </p:cNvPr>
@@ -4011,7 +4225,7 @@
           <a:p>
             <a:r>
               <a:rPr lang="en-US" dirty="0"/>
-              <a:t>Python read-write with Avro</a:t>
+              <a:t>Python read-write with Parquet?</a:t>
             </a:r>
             <a:endParaRPr lang="en-DK" dirty="0"/>
           </a:p>
@@ -4022,7 +4236,7 @@
           <p:cNvPr id="3" name="Pladsholder til indhold 2">
             <a:extLst>
               <a:ext uri="{FF2B5EF4-FFF2-40B4-BE49-F238E27FC236}">
-                <a16:creationId xmlns:a16="http://schemas.microsoft.com/office/drawing/2014/main" id="{CD419720-66BB-4586-B829-8972D766BF42}"/>
+                <a16:creationId xmlns:a16="http://schemas.microsoft.com/office/drawing/2014/main" id="{48D29DD8-2CAC-4C47-BF4D-CEB8B23E7B24}"/>
               </a:ext>
             </a:extLst>
           </p:cNvPr>
@@ -4038,89 +4252,11 @@
           <a:bodyPr/>
           <a:lstStyle/>
           <a:p>
-            <a:endParaRPr lang="en-DK"/>
-          </a:p>
-        </p:txBody>
-      </p:sp>
-    </p:spTree>
-    <p:extLst>
-      <p:ext uri="{BB962C8B-B14F-4D97-AF65-F5344CB8AC3E}">
-        <p14:creationId xmlns:p14="http://schemas.microsoft.com/office/powerpoint/2010/main" val="4113249153"/>
-      </p:ext>
-    </p:extLst>
-  </p:cSld>
-  <p:clrMapOvr>
-    <a:masterClrMapping/>
-  </p:clrMapOvr>
-</p:sld>
-</file>
-
-<file path=ppt/slides/slide9.xml><?xml version="1.0" encoding="utf-8"?>
-<p:sld xmlns:a="http://schemas.openxmlformats.org/drawingml/2006/main" xmlns:r="http://schemas.openxmlformats.org/officeDocument/2006/relationships" xmlns:p="http://schemas.openxmlformats.org/presentationml/2006/main">
-  <p:cSld>
-    <p:spTree>
-      <p:nvGrpSpPr>
-        <p:cNvPr id="1" name=""/>
-        <p:cNvGrpSpPr/>
-        <p:nvPr/>
-      </p:nvGrpSpPr>
-      <p:grpSpPr>
-        <a:xfrm>
-          <a:off x="0" y="0"/>
-          <a:ext cx="0" cy="0"/>
-          <a:chOff x="0" y="0"/>
-          <a:chExt cx="0" cy="0"/>
-        </a:xfrm>
-      </p:grpSpPr>
-      <p:sp>
-        <p:nvSpPr>
-          <p:cNvPr id="2" name="Titel 1">
-            <a:extLst>
-              <a:ext uri="{FF2B5EF4-FFF2-40B4-BE49-F238E27FC236}">
-                <a16:creationId xmlns:a16="http://schemas.microsoft.com/office/drawing/2014/main" id="{B78D32F1-D6C8-4A0E-8C53-522AE907F077}"/>
-              </a:ext>
-            </a:extLst>
-          </p:cNvPr>
-          <p:cNvSpPr>
-            <a:spLocks noGrp="1"/>
-          </p:cNvSpPr>
-          <p:nvPr>
-            <p:ph type="title"/>
-          </p:nvPr>
-        </p:nvSpPr>
-        <p:spPr/>
-        <p:txBody>
-          <a:bodyPr/>
-          <a:lstStyle/>
-          <a:p>
-            <a:r>
-              <a:rPr lang="en-US" dirty="0"/>
-              <a:t>Python read-write with Parquet?</a:t>
-            </a:r>
-            <a:endParaRPr lang="en-DK" dirty="0"/>
-          </a:p>
-        </p:txBody>
-      </p:sp>
-      <p:sp>
-        <p:nvSpPr>
-          <p:cNvPr id="3" name="Pladsholder til indhold 2">
-            <a:extLst>
-              <a:ext uri="{FF2B5EF4-FFF2-40B4-BE49-F238E27FC236}">
-                <a16:creationId xmlns:a16="http://schemas.microsoft.com/office/drawing/2014/main" id="{48D29DD8-2CAC-4C47-BF4D-CEB8B23E7B24}"/>
-              </a:ext>
-            </a:extLst>
-          </p:cNvPr>
-          <p:cNvSpPr>
-            <a:spLocks noGrp="1"/>
-          </p:cNvSpPr>
-          <p:nvPr>
-            <p:ph idx="1"/>
-          </p:nvPr>
-        </p:nvSpPr>
-        <p:spPr/>
-        <p:txBody>
-          <a:bodyPr/>
-          <a:lstStyle/>
+            <a:r>
+              <a:rPr lang="en-US" dirty="0"/>
+              <a:t>Write the 10 most common words and read it again using a Parquet file in the HDFS cluster</a:t>
+            </a:r>
+          </a:p>
           <a:p>
             <a:r>
               <a:rPr lang="en-US" dirty="0"/>

</xml_diff>

<commit_message>
Remove unnecessary port opening from docker-compose and updated presentation
</commit_message>
<xml_diff>
--- a/Lecture2/Lecture2Ex.pptx
+++ b/Lecture2/Lecture2Ex.pptx
@@ -9,10 +9,12 @@
     <p:sldId id="257" r:id="rId3"/>
     <p:sldId id="258" r:id="rId4"/>
     <p:sldId id="259" r:id="rId5"/>
-    <p:sldId id="260" r:id="rId6"/>
-    <p:sldId id="261" r:id="rId7"/>
-    <p:sldId id="262" r:id="rId8"/>
-    <p:sldId id="263" r:id="rId9"/>
+    <p:sldId id="265" r:id="rId6"/>
+    <p:sldId id="260" r:id="rId7"/>
+    <p:sldId id="261" r:id="rId8"/>
+    <p:sldId id="262" r:id="rId9"/>
+    <p:sldId id="263" r:id="rId10"/>
+    <p:sldId id="264" r:id="rId11"/>
   </p:sldIdLst>
   <p:sldSz cx="12192000" cy="6858000"/>
   <p:notesSz cx="6858000" cy="9144000"/>
@@ -3425,6 +3427,134 @@
 </p:sld>
 </file>
 
+<file path=ppt/slides/slide10.xml><?xml version="1.0" encoding="utf-8"?>
+<p:sld xmlns:a="http://schemas.openxmlformats.org/drawingml/2006/main" xmlns:r="http://schemas.openxmlformats.org/officeDocument/2006/relationships" xmlns:p="http://schemas.openxmlformats.org/presentationml/2006/main">
+  <p:cSld>
+    <p:spTree>
+      <p:nvGrpSpPr>
+        <p:cNvPr id="1" name=""/>
+        <p:cNvGrpSpPr/>
+        <p:nvPr/>
+      </p:nvGrpSpPr>
+      <p:grpSpPr>
+        <a:xfrm>
+          <a:off x="0" y="0"/>
+          <a:ext cx="0" cy="0"/>
+          <a:chOff x="0" y="0"/>
+          <a:chExt cx="0" cy="0"/>
+        </a:xfrm>
+      </p:grpSpPr>
+      <p:sp>
+        <p:nvSpPr>
+          <p:cNvPr id="2" name="Titel 1">
+            <a:extLst>
+              <a:ext uri="{FF2B5EF4-FFF2-40B4-BE49-F238E27FC236}">
+                <a16:creationId xmlns:a16="http://schemas.microsoft.com/office/drawing/2014/main" id="{C2E8F914-E8E4-42AA-BE68-5DEB7EB3AD0E}"/>
+              </a:ext>
+            </a:extLst>
+          </p:cNvPr>
+          <p:cNvSpPr>
+            <a:spLocks noGrp="1"/>
+          </p:cNvSpPr>
+          <p:nvPr>
+            <p:ph type="title"/>
+          </p:nvPr>
+        </p:nvSpPr>
+        <p:spPr/>
+        <p:txBody>
+          <a:bodyPr/>
+          <a:lstStyle/>
+          <a:p>
+            <a:r>
+              <a:rPr lang="en-US" dirty="0"/>
+              <a:t>Cleanup</a:t>
+            </a:r>
+            <a:endParaRPr lang="en-DK" dirty="0"/>
+          </a:p>
+        </p:txBody>
+      </p:sp>
+      <p:sp>
+        <p:nvSpPr>
+          <p:cNvPr id="3" name="Pladsholder til indhold 2">
+            <a:extLst>
+              <a:ext uri="{FF2B5EF4-FFF2-40B4-BE49-F238E27FC236}">
+                <a16:creationId xmlns:a16="http://schemas.microsoft.com/office/drawing/2014/main" id="{EDBA40D1-B145-4921-BF32-9146054ECED6}"/>
+              </a:ext>
+            </a:extLst>
+          </p:cNvPr>
+          <p:cNvSpPr>
+            <a:spLocks noGrp="1"/>
+          </p:cNvSpPr>
+          <p:nvPr>
+            <p:ph idx="1"/>
+          </p:nvPr>
+        </p:nvSpPr>
+        <p:spPr/>
+        <p:txBody>
+          <a:bodyPr/>
+          <a:lstStyle/>
+          <a:p>
+            <a:r>
+              <a:rPr lang="en-US" dirty="0"/>
+              <a:t>“docker image ls -a”</a:t>
+            </a:r>
+          </a:p>
+          <a:p>
+            <a:pPr lvl="1"/>
+            <a:r>
+              <a:rPr lang="en-US" dirty="0"/>
+              <a:t>Notice all the “&lt;none&gt;” images? They’re “dangling images”</a:t>
+            </a:r>
+          </a:p>
+          <a:p>
+            <a:pPr lvl="1"/>
+            <a:r>
+              <a:rPr lang="en-US" dirty="0"/>
+              <a:t>Takes no space on your computer</a:t>
+            </a:r>
+          </a:p>
+          <a:p>
+            <a:r>
+              <a:rPr lang="en-US" dirty="0"/>
+              <a:t>Remove by “docker image prune”</a:t>
+            </a:r>
+          </a:p>
+          <a:p>
+            <a:pPr lvl="1"/>
+            <a:r>
+              <a:rPr lang="en-US" dirty="0"/>
+              <a:t>Will only remove the dangling images</a:t>
+            </a:r>
+          </a:p>
+          <a:p>
+            <a:r>
+              <a:rPr lang="en-US" dirty="0"/>
+              <a:t>What about containers?</a:t>
+            </a:r>
+          </a:p>
+          <a:p>
+            <a:pPr lvl="1"/>
+            <a:r>
+              <a:rPr lang="en-US" dirty="0"/>
+              <a:t>The “run.cmd” contains “-rm”, which removes the container after container termination</a:t>
+            </a:r>
+            <a:endParaRPr lang="en-DK" dirty="0"/>
+          </a:p>
+        </p:txBody>
+      </p:sp>
+    </p:spTree>
+    <p:extLst>
+      <p:ext uri="{BB962C8B-B14F-4D97-AF65-F5344CB8AC3E}">
+        <p14:creationId xmlns:p14="http://schemas.microsoft.com/office/powerpoint/2010/main" val="630545042"/>
+      </p:ext>
+    </p:extLst>
+  </p:cSld>
+  <p:clrMapOvr>
+    <a:masterClrMapping/>
+  </p:clrMapOvr>
+</p:sld>
+</file>
+
 <file path=ppt/slides/slide2.xml><?xml version="1.0" encoding="utf-8"?>
 <p:sld xmlns:a="http://schemas.openxmlformats.org/drawingml/2006/main" xmlns:r="http://schemas.openxmlformats.org/officeDocument/2006/relationships" xmlns:p="http://schemas.openxmlformats.org/presentationml/2006/main">
   <p:cSld>
@@ -3753,11 +3883,19 @@
           <a:p>
             <a:r>
               <a:rPr lang="en-US" dirty="0" err="1"/>
-              <a:t>hadoop</a:t>
-            </a:r>
-            <a:r>
-              <a:rPr lang="en-US" dirty="0"/>
-              <a:t> fs –[command] [path]</a:t>
+              <a:t>hdfs</a:t>
+            </a:r>
+            <a:r>
+              <a:rPr lang="en-US" dirty="0"/>
+              <a:t> </a:t>
+            </a:r>
+            <a:r>
+              <a:rPr lang="en-US" dirty="0" err="1"/>
+              <a:t>dfs</a:t>
+            </a:r>
+            <a:r>
+              <a:rPr lang="en-US" dirty="0"/>
+              <a:t> –[command] [path]</a:t>
             </a:r>
           </a:p>
           <a:p>
@@ -3842,7 +3980,7 @@
           <p:cNvPr id="2" name="Titel 1">
             <a:extLst>
               <a:ext uri="{FF2B5EF4-FFF2-40B4-BE49-F238E27FC236}">
-                <a16:creationId xmlns:a16="http://schemas.microsoft.com/office/drawing/2014/main" id="{4B578FC5-C516-4E67-A13E-170509E83782}"/>
+                <a16:creationId xmlns:a16="http://schemas.microsoft.com/office/drawing/2014/main" id="{1171947C-C0DB-46E9-AEAA-26877902FF34}"/>
               </a:ext>
             </a:extLst>
           </p:cNvPr>
@@ -3860,7 +3998,7 @@
           <a:p>
             <a:r>
               <a:rPr lang="en-US" dirty="0"/>
-              <a:t>Python read-write example</a:t>
+              <a:t>Let’s download a book!</a:t>
             </a:r>
             <a:endParaRPr lang="en-DK" dirty="0"/>
           </a:p>
@@ -3871,7 +4009,7 @@
           <p:cNvPr id="3" name="Pladsholder til indhold 2">
             <a:extLst>
               <a:ext uri="{FF2B5EF4-FFF2-40B4-BE49-F238E27FC236}">
-                <a16:creationId xmlns:a16="http://schemas.microsoft.com/office/drawing/2014/main" id="{8066369E-5682-453F-A0F2-F764EBC69724}"/>
+                <a16:creationId xmlns:a16="http://schemas.microsoft.com/office/drawing/2014/main" id="{4CB25FD0-25D4-43B9-B00F-AB72B8577667}"/>
               </a:ext>
             </a:extLst>
           </p:cNvPr>
@@ -3888,38 +4026,76 @@
           <a:lstStyle/>
           <a:p>
             <a:r>
+              <a:rPr lang="en-US" dirty="0"/>
+              <a:t>“docker exec –</a:t>
+            </a:r>
+            <a:r>
               <a:rPr lang="en-US" dirty="0" err="1"/>
-              <a:t>Dockerfile</a:t>
-            </a:r>
-            <a:r>
-              <a:rPr lang="en-US" dirty="0"/>
-              <a:t> – Building Python containers</a:t>
-            </a:r>
-          </a:p>
-          <a:p>
-            <a:r>
-              <a:rPr lang="en-US" dirty="0"/>
-              <a:t>Run.cmd – Build and run container</a:t>
-            </a:r>
-          </a:p>
-          <a:p>
+              <a:t>ti</a:t>
+            </a:r>
+            <a:r>
+              <a:rPr lang="en-US" dirty="0"/>
+              <a:t> </a:t>
+            </a:r>
             <a:r>
               <a:rPr lang="en-US" dirty="0" err="1"/>
-              <a:t>HdfsCli</a:t>
-            </a:r>
-            <a:endParaRPr lang="en-US" dirty="0"/>
-          </a:p>
-          <a:p>
-            <a:pPr lvl="1"/>
-            <a:r>
-              <a:rPr lang="en-GB" dirty="0">
-                <a:hlinkClick r:id="rId2"/>
-              </a:rPr>
-              <a:t>https://hdfscli.readthedocs.io/en/latest/</a:t>
+              <a:t>namenode</a:t>
+            </a:r>
+            <a:r>
+              <a:rPr lang="en-US" dirty="0"/>
+              <a:t> /bin/bash”</a:t>
+            </a:r>
+          </a:p>
+          <a:p>
+            <a:r>
+              <a:rPr lang="en-US" dirty="0"/>
+              <a:t>“apt update”</a:t>
+            </a:r>
+          </a:p>
+          <a:p>
+            <a:r>
+              <a:rPr lang="en-US" dirty="0"/>
+              <a:t>“apt install </a:t>
+            </a:r>
+            <a:r>
+              <a:rPr lang="en-US" dirty="0" err="1"/>
+              <a:t>wget</a:t>
+            </a:r>
+            <a:r>
+              <a:rPr lang="en-US" dirty="0"/>
+              <a:t>”</a:t>
+            </a:r>
+          </a:p>
+          <a:p>
+            <a:r>
+              <a:rPr lang="en-US" dirty="0"/>
+              <a:t>“</a:t>
+            </a:r>
+            <a:r>
+              <a:rPr lang="pt-BR" dirty="0"/>
+              <a:t>wget -O alice.txt https://www.gutenberg.org/files/11/11-0.txt”</a:t>
+            </a:r>
+          </a:p>
+          <a:p>
+            <a:r>
+              <a:rPr lang="en-US" dirty="0"/>
+              <a:t>“</a:t>
+            </a:r>
+            <a:r>
+              <a:rPr lang="en-US" dirty="0" err="1"/>
+              <a:t>hdfs</a:t>
             </a:r>
             <a:r>
               <a:rPr lang="en-US" dirty="0"/>
               <a:t> </a:t>
+            </a:r>
+            <a:r>
+              <a:rPr lang="en-US" dirty="0" err="1"/>
+              <a:t>dfs</a:t>
+            </a:r>
+            <a:r>
+              <a:rPr lang="en-US" dirty="0"/>
+              <a:t> -put alice.txt /”</a:t>
             </a:r>
             <a:endParaRPr lang="en-DK" dirty="0"/>
           </a:p>
@@ -3928,7 +4104,7 @@
     </p:spTree>
     <p:extLst>
       <p:ext uri="{BB962C8B-B14F-4D97-AF65-F5344CB8AC3E}">
-        <p14:creationId xmlns:p14="http://schemas.microsoft.com/office/powerpoint/2010/main" val="3648333444"/>
+        <p14:creationId xmlns:p14="http://schemas.microsoft.com/office/powerpoint/2010/main" val="2819921117"/>
       </p:ext>
     </p:extLst>
   </p:cSld>
@@ -3960,7 +4136,7 @@
           <p:cNvPr id="2" name="Titel 1">
             <a:extLst>
               <a:ext uri="{FF2B5EF4-FFF2-40B4-BE49-F238E27FC236}">
-                <a16:creationId xmlns:a16="http://schemas.microsoft.com/office/drawing/2014/main" id="{4A2B4F8C-3E55-4F6C-B776-9620524D72F8}"/>
+                <a16:creationId xmlns:a16="http://schemas.microsoft.com/office/drawing/2014/main" id="{4B578FC5-C516-4E67-A13E-170509E83782}"/>
               </a:ext>
             </a:extLst>
           </p:cNvPr>
@@ -3978,7 +4154,7 @@
           <a:p>
             <a:r>
               <a:rPr lang="en-US" dirty="0"/>
-              <a:t>Python read-write with JSON</a:t>
+              <a:t>Python read-write example</a:t>
             </a:r>
             <a:endParaRPr lang="en-DK" dirty="0"/>
           </a:p>
@@ -3989,7 +4165,7 @@
           <p:cNvPr id="3" name="Pladsholder til indhold 2">
             <a:extLst>
               <a:ext uri="{FF2B5EF4-FFF2-40B4-BE49-F238E27FC236}">
-                <a16:creationId xmlns:a16="http://schemas.microsoft.com/office/drawing/2014/main" id="{3017DE31-31A6-4DDD-8B52-17C32643107F}"/>
+                <a16:creationId xmlns:a16="http://schemas.microsoft.com/office/drawing/2014/main" id="{8066369E-5682-453F-A0F2-F764EBC69724}"/>
               </a:ext>
             </a:extLst>
           </p:cNvPr>
@@ -4006,26 +4182,38 @@
           <a:lstStyle/>
           <a:p>
             <a:r>
-              <a:rPr lang="en-US" dirty="0"/>
-              <a:t>Only example.py changes!</a:t>
-            </a:r>
-          </a:p>
-          <a:p>
-            <a:r>
-              <a:rPr lang="en-US" dirty="0"/>
-              <a:t>Extends what we just learned with read-write</a:t>
-            </a:r>
-          </a:p>
-          <a:p>
-            <a:r>
-              <a:rPr lang="en-US" dirty="0"/>
-              <a:t>Uses “Counter” to count words</a:t>
-            </a:r>
-          </a:p>
-          <a:p>
-            <a:r>
-              <a:rPr lang="en-US" dirty="0"/>
-              <a:t>Dumps a JSON structure</a:t>
+              <a:rPr lang="en-US" dirty="0" err="1"/>
+              <a:t>Dockerfile</a:t>
+            </a:r>
+            <a:r>
+              <a:rPr lang="en-US" dirty="0"/>
+              <a:t> – Building Python containers</a:t>
+            </a:r>
+          </a:p>
+          <a:p>
+            <a:r>
+              <a:rPr lang="en-US" dirty="0"/>
+              <a:t>Run.cmd – Build and run container</a:t>
+            </a:r>
+          </a:p>
+          <a:p>
+            <a:r>
+              <a:rPr lang="en-US" dirty="0" err="1"/>
+              <a:t>HdfsCli</a:t>
+            </a:r>
+            <a:endParaRPr lang="en-US" dirty="0"/>
+          </a:p>
+          <a:p>
+            <a:pPr lvl="1"/>
+            <a:r>
+              <a:rPr lang="en-GB" dirty="0">
+                <a:hlinkClick r:id="rId2"/>
+              </a:rPr>
+              <a:t>https://hdfscli.readthedocs.io/en/latest/</a:t>
+            </a:r>
+            <a:r>
+              <a:rPr lang="en-US" dirty="0"/>
+              <a:t> </a:t>
             </a:r>
             <a:endParaRPr lang="en-DK" dirty="0"/>
           </a:p>
@@ -4034,7 +4222,7 @@
     </p:spTree>
     <p:extLst>
       <p:ext uri="{BB962C8B-B14F-4D97-AF65-F5344CB8AC3E}">
-        <p14:creationId xmlns:p14="http://schemas.microsoft.com/office/powerpoint/2010/main" val="3236422911"/>
+        <p14:creationId xmlns:p14="http://schemas.microsoft.com/office/powerpoint/2010/main" val="3648333444"/>
       </p:ext>
     </p:extLst>
   </p:cSld>
@@ -4066,6 +4254,112 @@
           <p:cNvPr id="2" name="Titel 1">
             <a:extLst>
               <a:ext uri="{FF2B5EF4-FFF2-40B4-BE49-F238E27FC236}">
+                <a16:creationId xmlns:a16="http://schemas.microsoft.com/office/drawing/2014/main" id="{4A2B4F8C-3E55-4F6C-B776-9620524D72F8}"/>
+              </a:ext>
+            </a:extLst>
+          </p:cNvPr>
+          <p:cNvSpPr>
+            <a:spLocks noGrp="1"/>
+          </p:cNvSpPr>
+          <p:nvPr>
+            <p:ph type="title"/>
+          </p:nvPr>
+        </p:nvSpPr>
+        <p:spPr/>
+        <p:txBody>
+          <a:bodyPr/>
+          <a:lstStyle/>
+          <a:p>
+            <a:r>
+              <a:rPr lang="en-US" dirty="0"/>
+              <a:t>Python read-write with JSON</a:t>
+            </a:r>
+            <a:endParaRPr lang="en-DK" dirty="0"/>
+          </a:p>
+        </p:txBody>
+      </p:sp>
+      <p:sp>
+        <p:nvSpPr>
+          <p:cNvPr id="3" name="Pladsholder til indhold 2">
+            <a:extLst>
+              <a:ext uri="{FF2B5EF4-FFF2-40B4-BE49-F238E27FC236}">
+                <a16:creationId xmlns:a16="http://schemas.microsoft.com/office/drawing/2014/main" id="{3017DE31-31A6-4DDD-8B52-17C32643107F}"/>
+              </a:ext>
+            </a:extLst>
+          </p:cNvPr>
+          <p:cNvSpPr>
+            <a:spLocks noGrp="1"/>
+          </p:cNvSpPr>
+          <p:nvPr>
+            <p:ph idx="1"/>
+          </p:nvPr>
+        </p:nvSpPr>
+        <p:spPr/>
+        <p:txBody>
+          <a:bodyPr/>
+          <a:lstStyle/>
+          <a:p>
+            <a:r>
+              <a:rPr lang="en-US" dirty="0"/>
+              <a:t>Only example.py changes!</a:t>
+            </a:r>
+          </a:p>
+          <a:p>
+            <a:r>
+              <a:rPr lang="en-US" dirty="0"/>
+              <a:t>Extends what we just learned with read-write</a:t>
+            </a:r>
+          </a:p>
+          <a:p>
+            <a:r>
+              <a:rPr lang="en-US" dirty="0"/>
+              <a:t>Uses “Counter” to count words</a:t>
+            </a:r>
+          </a:p>
+          <a:p>
+            <a:r>
+              <a:rPr lang="en-US" dirty="0"/>
+              <a:t>Dumps a JSON structure</a:t>
+            </a:r>
+            <a:endParaRPr lang="en-DK" dirty="0"/>
+          </a:p>
+        </p:txBody>
+      </p:sp>
+    </p:spTree>
+    <p:extLst>
+      <p:ext uri="{BB962C8B-B14F-4D97-AF65-F5344CB8AC3E}">
+        <p14:creationId xmlns:p14="http://schemas.microsoft.com/office/powerpoint/2010/main" val="3236422911"/>
+      </p:ext>
+    </p:extLst>
+  </p:cSld>
+  <p:clrMapOvr>
+    <a:masterClrMapping/>
+  </p:clrMapOvr>
+</p:sld>
+</file>
+
+<file path=ppt/slides/slide8.xml><?xml version="1.0" encoding="utf-8"?>
+<p:sld xmlns:a="http://schemas.openxmlformats.org/drawingml/2006/main" xmlns:r="http://schemas.openxmlformats.org/officeDocument/2006/relationships" xmlns:p="http://schemas.openxmlformats.org/presentationml/2006/main">
+  <p:cSld>
+    <p:spTree>
+      <p:nvGrpSpPr>
+        <p:cNvPr id="1" name=""/>
+        <p:cNvGrpSpPr/>
+        <p:nvPr/>
+      </p:nvGrpSpPr>
+      <p:grpSpPr>
+        <a:xfrm>
+          <a:off x="0" y="0"/>
+          <a:ext cx="0" cy="0"/>
+          <a:chOff x="0" y="0"/>
+          <a:chExt cx="0" cy="0"/>
+        </a:xfrm>
+      </p:grpSpPr>
+      <p:sp>
+        <p:nvSpPr>
+          <p:cNvPr id="2" name="Titel 1">
+            <a:extLst>
+              <a:ext uri="{FF2B5EF4-FFF2-40B4-BE49-F238E27FC236}">
                 <a16:creationId xmlns:a16="http://schemas.microsoft.com/office/drawing/2014/main" id="{C12DA0BA-3AF3-4458-919D-9790B2DF1B79}"/>
               </a:ext>
             </a:extLst>
@@ -4167,6 +4461,47 @@
             <a:r>
               <a:rPr lang="en-US" dirty="0"/>
               <a:t>“reader” can be traversed as a list</a:t>
+            </a:r>
+          </a:p>
+          <a:p>
+            <a:r>
+              <a:rPr lang="en-US" dirty="0"/>
+              <a:t>“</a:t>
+            </a:r>
+            <a:r>
+              <a:rPr lang="en-US" dirty="0" err="1"/>
+              <a:t>hdfs</a:t>
+            </a:r>
+            <a:r>
+              <a:rPr lang="en-US" dirty="0"/>
+              <a:t> </a:t>
+            </a:r>
+            <a:r>
+              <a:rPr lang="en-US" dirty="0" err="1"/>
+              <a:t>dfs</a:t>
+            </a:r>
+            <a:r>
+              <a:rPr lang="en-US" dirty="0"/>
+              <a:t> –cat /word-</a:t>
+            </a:r>
+            <a:r>
+              <a:rPr lang="en-US" dirty="0" err="1"/>
+              <a:t>count.avro</a:t>
+            </a:r>
+            <a:r>
+              <a:rPr lang="en-US" dirty="0"/>
+              <a:t>”</a:t>
+            </a:r>
+          </a:p>
+          <a:p>
+            <a:pPr lvl="1"/>
+            <a:r>
+              <a:rPr lang="en-US" dirty="0"/>
+              <a:t>Is the </a:t>
+            </a:r>
+            <a:r>
+              <a:rPr lang="en-US"/>
+              <a:t>result expected?</a:t>
             </a:r>
             <a:endParaRPr lang="en-DK" dirty="0"/>
           </a:p>
@@ -4185,7 +4520,7 @@
 </p:sld>
 </file>
 
-<file path=ppt/slides/slide8.xml><?xml version="1.0" encoding="utf-8"?>
+<file path=ppt/slides/slide9.xml><?xml version="1.0" encoding="utf-8"?>
 <p:sld xmlns:a="http://schemas.openxmlformats.org/drawingml/2006/main" xmlns:r="http://schemas.openxmlformats.org/officeDocument/2006/relationships" xmlns:p="http://schemas.openxmlformats.org/presentationml/2006/main">
   <p:cSld>
     <p:spTree>

</xml_diff>